<commit_message>
OnLib.pptx - Deployment View
</commit_message>
<xml_diff>
--- a/Semester 1 Ende/OnLib.pptx
+++ b/Semester 1 Ende/OnLib.pptx
@@ -13,14 +13,15 @@
     <p:sldId id="260" r:id="rId7"/>
     <p:sldId id="262" r:id="rId8"/>
     <p:sldId id="264" r:id="rId9"/>
-    <p:sldId id="266" r:id="rId10"/>
-    <p:sldId id="261" r:id="rId11"/>
-    <p:sldId id="265" r:id="rId12"/>
+    <p:sldId id="268" r:id="rId10"/>
+    <p:sldId id="266" r:id="rId11"/>
+    <p:sldId id="261" r:id="rId12"/>
+    <p:sldId id="265" r:id="rId13"/>
   </p:sldIdLst>
   <p:sldSz cx="9144000" cy="6858000" type="screen4x3"/>
   <p:notesSz cx="6858000" cy="9144000"/>
   <p:custDataLst>
-    <p:tags r:id="rId13"/>
+    <p:tags r:id="rId14"/>
   </p:custDataLst>
   <p:defaultTextStyle>
     <a:defPPr>
@@ -312,7 +313,8 @@
           <a:p>
             <a:fld id="{9D749DC6-C47B-4FF1-B694-5F5D9172E773}" type="datetimeFigureOut">
               <a:rPr lang="de-DE" smtClean="0"/>
-              <a:t>10.12.2013</a:t>
+              <a:pPr/>
+              <a:t>11.12.2013</a:t>
             </a:fld>
             <a:endParaRPr lang="de-DE"/>
           </a:p>
@@ -335,6 +337,7 @@
           <a:p>
             <a:fld id="{B5A022B6-A5D6-4E49-AEFD-3E1813543E52}" type="slidenum">
               <a:rPr lang="de-DE" smtClean="0"/>
+              <a:pPr/>
               <a:t>‹Nr.›</a:t>
             </a:fld>
             <a:endParaRPr lang="de-DE"/>
@@ -477,7 +480,8 @@
           <a:p>
             <a:fld id="{9D749DC6-C47B-4FF1-B694-5F5D9172E773}" type="datetimeFigureOut">
               <a:rPr lang="de-DE" smtClean="0"/>
-              <a:t>10.12.2013</a:t>
+              <a:pPr/>
+              <a:t>11.12.2013</a:t>
             </a:fld>
             <a:endParaRPr lang="de-DE"/>
           </a:p>
@@ -519,6 +523,7 @@
           <a:p>
             <a:fld id="{B5A022B6-A5D6-4E49-AEFD-3E1813543E52}" type="slidenum">
               <a:rPr lang="de-DE" smtClean="0"/>
+              <a:pPr/>
               <a:t>‹Nr.›</a:t>
             </a:fld>
             <a:endParaRPr lang="de-DE"/>
@@ -652,7 +657,8 @@
           <a:p>
             <a:fld id="{9D749DC6-C47B-4FF1-B694-5F5D9172E773}" type="datetimeFigureOut">
               <a:rPr lang="de-DE" smtClean="0"/>
-              <a:t>10.12.2013</a:t>
+              <a:pPr/>
+              <a:t>11.12.2013</a:t>
             </a:fld>
             <a:endParaRPr lang="de-DE"/>
           </a:p>
@@ -694,6 +700,7 @@
           <a:p>
             <a:fld id="{B5A022B6-A5D6-4E49-AEFD-3E1813543E52}" type="slidenum">
               <a:rPr lang="de-DE" smtClean="0"/>
+              <a:pPr/>
               <a:t>‹Nr.›</a:t>
             </a:fld>
             <a:endParaRPr lang="de-DE"/>
@@ -835,7 +842,8 @@
           <a:p>
             <a:fld id="{9D749DC6-C47B-4FF1-B694-5F5D9172E773}" type="datetimeFigureOut">
               <a:rPr lang="de-DE" smtClean="0"/>
-              <a:t>10.12.2013</a:t>
+              <a:pPr/>
+              <a:t>11.12.2013</a:t>
             </a:fld>
             <a:endParaRPr lang="de-DE"/>
           </a:p>
@@ -877,6 +885,7 @@
           <a:p>
             <a:fld id="{B5A022B6-A5D6-4E49-AEFD-3E1813543E52}" type="slidenum">
               <a:rPr lang="de-DE" smtClean="0"/>
+              <a:pPr/>
               <a:t>‹Nr.›</a:t>
             </a:fld>
             <a:endParaRPr lang="de-DE"/>
@@ -1097,7 +1106,8 @@
           <a:p>
             <a:fld id="{9D749DC6-C47B-4FF1-B694-5F5D9172E773}" type="datetimeFigureOut">
               <a:rPr lang="de-DE" smtClean="0"/>
-              <a:t>10.12.2013</a:t>
+              <a:pPr/>
+              <a:t>11.12.2013</a:t>
             </a:fld>
             <a:endParaRPr lang="de-DE"/>
           </a:p>
@@ -1139,6 +1149,7 @@
           <a:p>
             <a:fld id="{B5A022B6-A5D6-4E49-AEFD-3E1813543E52}" type="slidenum">
               <a:rPr lang="de-DE" smtClean="0"/>
+              <a:pPr/>
               <a:t>‹Nr.›</a:t>
             </a:fld>
             <a:endParaRPr lang="de-DE"/>
@@ -1445,7 +1456,8 @@
           <a:p>
             <a:fld id="{9D749DC6-C47B-4FF1-B694-5F5D9172E773}" type="datetimeFigureOut">
               <a:rPr lang="de-DE" smtClean="0"/>
-              <a:t>10.12.2013</a:t>
+              <a:pPr/>
+              <a:t>11.12.2013</a:t>
             </a:fld>
             <a:endParaRPr lang="de-DE"/>
           </a:p>
@@ -1487,6 +1499,7 @@
           <a:p>
             <a:fld id="{B5A022B6-A5D6-4E49-AEFD-3E1813543E52}" type="slidenum">
               <a:rPr lang="de-DE" smtClean="0"/>
+              <a:pPr/>
               <a:t>‹Nr.›</a:t>
             </a:fld>
             <a:endParaRPr lang="de-DE"/>
@@ -1753,7 +1766,8 @@
           <a:p>
             <a:fld id="{9D749DC6-C47B-4FF1-B694-5F5D9172E773}" type="datetimeFigureOut">
               <a:rPr lang="de-DE" smtClean="0"/>
-              <a:t>10.12.2013</a:t>
+              <a:pPr/>
+              <a:t>11.12.2013</a:t>
             </a:fld>
             <a:endParaRPr lang="de-DE"/>
           </a:p>
@@ -1795,6 +1809,7 @@
           <a:p>
             <a:fld id="{B5A022B6-A5D6-4E49-AEFD-3E1813543E52}" type="slidenum">
               <a:rPr lang="de-DE" smtClean="0"/>
+              <a:pPr/>
               <a:t>‹Nr.›</a:t>
             </a:fld>
             <a:endParaRPr lang="de-DE"/>
@@ -1980,7 +1995,8 @@
           <a:p>
             <a:fld id="{9D749DC6-C47B-4FF1-B694-5F5D9172E773}" type="datetimeFigureOut">
               <a:rPr lang="de-DE" smtClean="0"/>
-              <a:t>10.12.2013</a:t>
+              <a:pPr/>
+              <a:t>11.12.2013</a:t>
             </a:fld>
             <a:endParaRPr lang="de-DE"/>
           </a:p>
@@ -2022,6 +2038,7 @@
           <a:p>
             <a:fld id="{B5A022B6-A5D6-4E49-AEFD-3E1813543E52}" type="slidenum">
               <a:rPr lang="de-DE" smtClean="0"/>
+              <a:pPr/>
               <a:t>‹Nr.›</a:t>
             </a:fld>
             <a:endParaRPr lang="de-DE"/>
@@ -2070,7 +2087,8 @@
           <a:p>
             <a:fld id="{9D749DC6-C47B-4FF1-B694-5F5D9172E773}" type="datetimeFigureOut">
               <a:rPr lang="de-DE" smtClean="0"/>
-              <a:t>10.12.2013</a:t>
+              <a:pPr/>
+              <a:t>11.12.2013</a:t>
             </a:fld>
             <a:endParaRPr lang="de-DE"/>
           </a:p>
@@ -2112,6 +2130,7 @@
           <a:p>
             <a:fld id="{B5A022B6-A5D6-4E49-AEFD-3E1813543E52}" type="slidenum">
               <a:rPr lang="de-DE" smtClean="0"/>
+              <a:pPr/>
               <a:t>‹Nr.›</a:t>
             </a:fld>
             <a:endParaRPr lang="de-DE"/>
@@ -2358,7 +2377,8 @@
           <a:p>
             <a:fld id="{9D749DC6-C47B-4FF1-B694-5F5D9172E773}" type="datetimeFigureOut">
               <a:rPr lang="de-DE" smtClean="0"/>
-              <a:t>10.12.2013</a:t>
+              <a:pPr/>
+              <a:t>11.12.2013</a:t>
             </a:fld>
             <a:endParaRPr lang="de-DE"/>
           </a:p>
@@ -2400,6 +2420,7 @@
           <a:p>
             <a:fld id="{B5A022B6-A5D6-4E49-AEFD-3E1813543E52}" type="slidenum">
               <a:rPr lang="de-DE" smtClean="0"/>
+              <a:pPr/>
               <a:t>‹Nr.›</a:t>
             </a:fld>
             <a:endParaRPr lang="de-DE"/>
@@ -2627,7 +2648,8 @@
           <a:p>
             <a:fld id="{9D749DC6-C47B-4FF1-B694-5F5D9172E773}" type="datetimeFigureOut">
               <a:rPr lang="de-DE" smtClean="0"/>
-              <a:t>10.12.2013</a:t>
+              <a:pPr/>
+              <a:t>11.12.2013</a:t>
             </a:fld>
             <a:endParaRPr lang="de-DE"/>
           </a:p>
@@ -2669,6 +2691,7 @@
           <a:p>
             <a:fld id="{B5A022B6-A5D6-4E49-AEFD-3E1813543E52}" type="slidenum">
               <a:rPr lang="de-DE" smtClean="0"/>
+              <a:pPr/>
               <a:t>‹Nr.›</a:t>
             </a:fld>
             <a:endParaRPr lang="de-DE"/>
@@ -2837,7 +2860,8 @@
           <a:p>
             <a:fld id="{9D749DC6-C47B-4FF1-B694-5F5D9172E773}" type="datetimeFigureOut">
               <a:rPr lang="de-DE" smtClean="0"/>
-              <a:t>10.12.2013</a:t>
+              <a:pPr/>
+              <a:t>11.12.2013</a:t>
             </a:fld>
             <a:endParaRPr lang="de-DE"/>
           </a:p>
@@ -2919,6 +2943,7 @@
           <a:p>
             <a:fld id="{B5A022B6-A5D6-4E49-AEFD-3E1813543E52}" type="slidenum">
               <a:rPr lang="de-DE" smtClean="0"/>
+              <a:pPr/>
               <a:t>‹Nr.›</a:t>
             </a:fld>
             <a:endParaRPr lang="de-DE"/>
@@ -3414,7 +3439,7 @@
     </p:spTree>
     <p:extLst>
       <p:ext uri="{BB962C8B-B14F-4D97-AF65-F5344CB8AC3E}">
-        <p14:creationId xmlns:p14="http://schemas.microsoft.com/office/powerpoint/2010/main" val="3833381630"/>
+        <p14:creationId xmlns:p14="http://schemas.microsoft.com/office/powerpoint/2010/main" xmlns="" val="3833381630"/>
       </p:ext>
     </p:extLst>
   </p:cSld>
@@ -3465,7 +3490,7 @@
           <a:p>
             <a:r>
               <a:rPr lang="de-DE" dirty="0" smtClean="0"/>
-              <a:t>Technische Leistungen</a:t>
+              <a:t>Links</a:t>
             </a:r>
             <a:endParaRPr lang="de-DE" dirty="0"/>
           </a:p>
@@ -3488,14 +3513,23 @@
           <a:p>
             <a:r>
               <a:rPr lang="de-DE" dirty="0" smtClean="0"/>
-              <a:t>Demo: </a:t>
+              <a:t>Blog: </a:t>
             </a:r>
             <a:r>
               <a:rPr lang="de-DE" dirty="0">
                 <a:hlinkClick r:id="rId2"/>
               </a:rPr>
-              <a:t>http://torsten-werner.com/OnLibDev/</a:t>
-            </a:r>
+              <a:t>https://www.coursesites.com/webapps/portal/frameset.jsp?tab_tab_group_id=null&amp;url=%</a:t>
+            </a:r>
+            <a:r>
+              <a:rPr lang="de-DE" dirty="0" smtClean="0">
+                <a:hlinkClick r:id="rId2"/>
+              </a:rPr>
+              <a:t>2Fwebapps%2Fblackboard%2Fexecute%2Flauncher%3Ftype%3DCourse%26id%3D_261651_1%26url%3D</a:t>
+            </a:r>
+            <a:endParaRPr lang="de-DE" dirty="0" smtClean="0"/>
+          </a:p>
+          <a:p>
             <a:endParaRPr lang="de-DE" dirty="0"/>
           </a:p>
         </p:txBody>
@@ -3503,7 +3537,7 @@
     </p:spTree>
     <p:extLst>
       <p:ext uri="{BB962C8B-B14F-4D97-AF65-F5344CB8AC3E}">
-        <p14:creationId xmlns:p14="http://schemas.microsoft.com/office/powerpoint/2010/main" val="2311595745"/>
+        <p14:creationId xmlns:p14="http://schemas.microsoft.com/office/powerpoint/2010/main" xmlns="" val="1560432982"/>
       </p:ext>
     </p:extLst>
   </p:cSld>
@@ -3554,7 +3588,7 @@
           <a:p>
             <a:r>
               <a:rPr lang="de-DE" dirty="0" smtClean="0"/>
-              <a:t>Fehlt noch</a:t>
+              <a:t>Technische Leistungen</a:t>
             </a:r>
             <a:endParaRPr lang="de-DE" dirty="0"/>
           </a:p>
@@ -3576,35 +3610,124 @@
           <a:lstStyle/>
           <a:p>
             <a:r>
-              <a:rPr lang="de-DE" dirty="0" err="1" smtClean="0"/>
-              <a:t>Deployment</a:t>
-            </a:r>
-            <a:r>
               <a:rPr lang="de-DE" dirty="0" smtClean="0"/>
-              <a:t> </a:t>
-            </a:r>
-            <a:r>
-              <a:rPr lang="de-DE" dirty="0" err="1" smtClean="0"/>
-              <a:t>Diagram</a:t>
-            </a:r>
-            <a:r>
-              <a:rPr lang="de-DE" dirty="0" smtClean="0"/>
-              <a:t> </a:t>
-            </a:r>
-          </a:p>
-          <a:p>
-            <a:r>
-              <a:rPr lang="de-DE" smtClean="0"/>
-              <a:t>Aufbau Framework</a:t>
-            </a:r>
-            <a:endParaRPr lang="de-DE" dirty="0" smtClean="0"/>
+              <a:t>Demo: </a:t>
+            </a:r>
+            <a:r>
+              <a:rPr lang="de-DE" dirty="0">
+                <a:hlinkClick r:id="rId2"/>
+              </a:rPr>
+              <a:t>http://torsten-werner.com/OnLibDev/</a:t>
+            </a:r>
+            <a:endParaRPr lang="de-DE" dirty="0"/>
           </a:p>
         </p:txBody>
       </p:sp>
     </p:spTree>
     <p:extLst>
       <p:ext uri="{BB962C8B-B14F-4D97-AF65-F5344CB8AC3E}">
-        <p14:creationId xmlns:p14="http://schemas.microsoft.com/office/powerpoint/2010/main" val="3944274436"/>
+        <p14:creationId xmlns:p14="http://schemas.microsoft.com/office/powerpoint/2010/main" xmlns="" val="2311595745"/>
+      </p:ext>
+    </p:extLst>
+  </p:cSld>
+  <p:clrMapOvr>
+    <a:masterClrMapping/>
+  </p:clrMapOvr>
+  <p:timing>
+    <p:tnLst>
+      <p:par>
+        <p:cTn id="1" dur="indefinite" restart="never" nodeType="tmRoot"/>
+      </p:par>
+    </p:tnLst>
+  </p:timing>
+</p:sld>
+</file>
+
+<file path=ppt/slides/slide12.xml><?xml version="1.0" encoding="utf-8"?>
+<p:sld xmlns:a="http://schemas.openxmlformats.org/drawingml/2006/main" xmlns:r="http://schemas.openxmlformats.org/officeDocument/2006/relationships" xmlns:p="http://schemas.openxmlformats.org/presentationml/2006/main">
+  <p:cSld>
+    <p:spTree>
+      <p:nvGrpSpPr>
+        <p:cNvPr id="1" name=""/>
+        <p:cNvGrpSpPr/>
+        <p:nvPr/>
+      </p:nvGrpSpPr>
+      <p:grpSpPr>
+        <a:xfrm>
+          <a:off x="0" y="0"/>
+          <a:ext cx="0" cy="0"/>
+          <a:chOff x="0" y="0"/>
+          <a:chExt cx="0" cy="0"/>
+        </a:xfrm>
+      </p:grpSpPr>
+      <p:sp>
+        <p:nvSpPr>
+          <p:cNvPr id="2" name="Titel 1"/>
+          <p:cNvSpPr>
+            <a:spLocks noGrp="1"/>
+          </p:cNvSpPr>
+          <p:nvPr>
+            <p:ph type="title"/>
+          </p:nvPr>
+        </p:nvSpPr>
+        <p:spPr/>
+        <p:txBody>
+          <a:bodyPr/>
+          <a:lstStyle/>
+          <a:p>
+            <a:r>
+              <a:rPr lang="de-DE" dirty="0" smtClean="0"/>
+              <a:t>Fehlt noch</a:t>
+            </a:r>
+            <a:endParaRPr lang="de-DE" dirty="0"/>
+          </a:p>
+        </p:txBody>
+      </p:sp>
+      <p:sp>
+        <p:nvSpPr>
+          <p:cNvPr id="3" name="Inhaltsplatzhalter 2"/>
+          <p:cNvSpPr>
+            <a:spLocks noGrp="1"/>
+          </p:cNvSpPr>
+          <p:nvPr>
+            <p:ph idx="1"/>
+          </p:nvPr>
+        </p:nvSpPr>
+        <p:spPr/>
+        <p:txBody>
+          <a:bodyPr/>
+          <a:lstStyle/>
+          <a:p>
+            <a:r>
+              <a:rPr lang="de-DE" dirty="0" err="1" smtClean="0"/>
+              <a:t>Deployment</a:t>
+            </a:r>
+            <a:r>
+              <a:rPr lang="de-DE" dirty="0" smtClean="0"/>
+              <a:t> </a:t>
+            </a:r>
+            <a:r>
+              <a:rPr lang="de-DE" dirty="0" err="1" smtClean="0"/>
+              <a:t>Diagram</a:t>
+            </a:r>
+            <a:r>
+              <a:rPr lang="de-DE" dirty="0" smtClean="0"/>
+              <a:t> </a:t>
+            </a:r>
+          </a:p>
+          <a:p>
+            <a:r>
+              <a:rPr lang="de-DE" smtClean="0"/>
+              <a:t>Aufbau Framework</a:t>
+            </a:r>
+            <a:endParaRPr lang="de-DE" dirty="0" smtClean="0"/>
+          </a:p>
+        </p:txBody>
+      </p:sp>
+    </p:spTree>
+    <p:extLst>
+      <p:ext uri="{BB962C8B-B14F-4D97-AF65-F5344CB8AC3E}">
+        <p14:creationId xmlns:p14="http://schemas.microsoft.com/office/powerpoint/2010/main" xmlns="" val="3944274436"/>
       </p:ext>
     </p:extLst>
   </p:cSld>
@@ -3759,7 +3882,7 @@
     </p:spTree>
     <p:extLst>
       <p:ext uri="{BB962C8B-B14F-4D97-AF65-F5344CB8AC3E}">
-        <p14:creationId xmlns:p14="http://schemas.microsoft.com/office/powerpoint/2010/main" val="3655997885"/>
+        <p14:creationId xmlns:p14="http://schemas.microsoft.com/office/powerpoint/2010/main" xmlns="" val="3655997885"/>
       </p:ext>
     </p:extLst>
   </p:cSld>
@@ -3826,7 +3949,7 @@
             <p:ph idx="1"/>
             <p:extLst>
               <p:ext uri="{D42A27DB-BD31-4B8C-83A1-F6EECF244321}">
-                <p14:modId xmlns:p14="http://schemas.microsoft.com/office/powerpoint/2010/main" val="1021946998"/>
+                <p14:modId xmlns:p14="http://schemas.microsoft.com/office/powerpoint/2010/main" xmlns="" val="1021946998"/>
               </p:ext>
             </p:extLst>
           </p:nvPr>
@@ -4365,7 +4488,7 @@
     </p:spTree>
     <p:extLst>
       <p:ext uri="{BB962C8B-B14F-4D97-AF65-F5344CB8AC3E}">
-        <p14:creationId xmlns:p14="http://schemas.microsoft.com/office/powerpoint/2010/main" val="1343455114"/>
+        <p14:creationId xmlns:p14="http://schemas.microsoft.com/office/powerpoint/2010/main" xmlns="" val="1343455114"/>
       </p:ext>
     </p:extLst>
   </p:cSld>
@@ -4477,7 +4600,7 @@
     </p:spTree>
     <p:extLst>
       <p:ext uri="{BB962C8B-B14F-4D97-AF65-F5344CB8AC3E}">
-        <p14:creationId xmlns:p14="http://schemas.microsoft.com/office/powerpoint/2010/main" val="3643120636"/>
+        <p14:creationId xmlns:p14="http://schemas.microsoft.com/office/powerpoint/2010/main" xmlns="" val="3643120636"/>
       </p:ext>
     </p:extLst>
   </p:cSld>
@@ -4549,10 +4672,10 @@
           </p:nvPr>
         </p:nvPicPr>
         <p:blipFill>
-          <a:blip r:embed="rId2">
+          <a:blip r:embed="rId2" cstate="print">
             <a:extLst>
               <a:ext uri="{28A0092B-C50C-407E-A947-70E740481C1C}">
-                <a14:useLocalDpi xmlns:a14="http://schemas.microsoft.com/office/drawing/2010/main" val="0"/>
+                <a14:useLocalDpi xmlns:a14="http://schemas.microsoft.com/office/drawing/2010/main" xmlns="" val="0"/>
               </a:ext>
             </a:extLst>
           </a:blip>
@@ -4570,7 +4693,7 @@
     </p:spTree>
     <p:extLst>
       <p:ext uri="{BB962C8B-B14F-4D97-AF65-F5344CB8AC3E}">
-        <p14:creationId xmlns:p14="http://schemas.microsoft.com/office/powerpoint/2010/main" val="1629079801"/>
+        <p14:creationId xmlns:p14="http://schemas.microsoft.com/office/powerpoint/2010/main" xmlns="" val="1629079801"/>
       </p:ext>
     </p:extLst>
   </p:cSld>
@@ -4638,10 +4761,10 @@
           </p:nvPr>
         </p:nvPicPr>
         <p:blipFill>
-          <a:blip r:embed="rId2">
+          <a:blip r:embed="rId2" cstate="print">
             <a:extLst>
               <a:ext uri="{28A0092B-C50C-407E-A947-70E740481C1C}">
-                <a14:useLocalDpi xmlns:a14="http://schemas.microsoft.com/office/drawing/2010/main" val="0"/>
+                <a14:useLocalDpi xmlns:a14="http://schemas.microsoft.com/office/drawing/2010/main" xmlns="" val="0"/>
               </a:ext>
             </a:extLst>
           </a:blip>
@@ -4659,7 +4782,7 @@
     </p:spTree>
     <p:extLst>
       <p:ext uri="{BB962C8B-B14F-4D97-AF65-F5344CB8AC3E}">
-        <p14:creationId xmlns:p14="http://schemas.microsoft.com/office/powerpoint/2010/main" val="1131379367"/>
+        <p14:creationId xmlns:p14="http://schemas.microsoft.com/office/powerpoint/2010/main" xmlns="" val="1131379367"/>
       </p:ext>
     </p:extLst>
   </p:cSld>
@@ -4824,7 +4947,7 @@
     </p:spTree>
     <p:extLst>
       <p:ext uri="{BB962C8B-B14F-4D97-AF65-F5344CB8AC3E}">
-        <p14:creationId xmlns:p14="http://schemas.microsoft.com/office/powerpoint/2010/main" val="2911736427"/>
+        <p14:creationId xmlns:p14="http://schemas.microsoft.com/office/powerpoint/2010/main" xmlns="" val="2911736427"/>
       </p:ext>
     </p:extLst>
   </p:cSld>
@@ -4892,10 +5015,10 @@
           </p:nvPr>
         </p:nvPicPr>
         <p:blipFill>
-          <a:blip r:embed="rId2">
+          <a:blip r:embed="rId2" cstate="print">
             <a:extLst>
               <a:ext uri="{28A0092B-C50C-407E-A947-70E740481C1C}">
-                <a14:useLocalDpi xmlns:a14="http://schemas.microsoft.com/office/drawing/2010/main" val="0"/>
+                <a14:useLocalDpi xmlns:a14="http://schemas.microsoft.com/office/drawing/2010/main" xmlns="" val="0"/>
               </a:ext>
             </a:extLst>
           </a:blip>
@@ -4921,7 +5044,7 @@
     </p:spTree>
     <p:extLst>
       <p:ext uri="{BB962C8B-B14F-4D97-AF65-F5344CB8AC3E}">
-        <p14:creationId xmlns:p14="http://schemas.microsoft.com/office/powerpoint/2010/main" val="813013107"/>
+        <p14:creationId xmlns:p14="http://schemas.microsoft.com/office/powerpoint/2010/main" xmlns="" val="813013107"/>
       </p:ext>
     </p:extLst>
   </p:cSld>
@@ -4971,57 +5094,41 @@
           <a:lstStyle/>
           <a:p>
             <a:r>
+              <a:rPr lang="de-DE" dirty="0" err="1" smtClean="0"/>
+              <a:t>Deployment</a:t>
+            </a:r>
+            <a:r>
               <a:rPr lang="de-DE" dirty="0" smtClean="0"/>
-              <a:t>Links</a:t>
+              <a:t> View</a:t>
             </a:r>
             <a:endParaRPr lang="de-DE" dirty="0"/>
           </a:p>
         </p:txBody>
       </p:sp>
-      <p:sp>
-        <p:nvSpPr>
-          <p:cNvPr id="3" name="Inhaltsplatzhalter 2"/>
-          <p:cNvSpPr>
-            <a:spLocks noGrp="1"/>
-          </p:cNvSpPr>
+      <p:pic>
+        <p:nvPicPr>
+          <p:cNvPr id="4" name="Inhaltsplatzhalter 3" descr="DeploymentView.png"/>
+          <p:cNvPicPr>
+            <a:picLocks noGrp="1" noChangeAspect="1"/>
+          </p:cNvPicPr>
           <p:nvPr>
             <p:ph idx="1"/>
           </p:nvPr>
-        </p:nvSpPr>
-        <p:spPr/>
-        <p:txBody>
-          <a:bodyPr/>
-          <a:lstStyle/>
-          <a:p>
-            <a:r>
-              <a:rPr lang="de-DE" dirty="0" smtClean="0"/>
-              <a:t>Blog: </a:t>
-            </a:r>
-            <a:r>
-              <a:rPr lang="de-DE" dirty="0">
-                <a:hlinkClick r:id="rId2"/>
-              </a:rPr>
-              <a:t>https://www.coursesites.com/webapps/portal/frameset.jsp?tab_tab_group_id=null&amp;url=%</a:t>
-            </a:r>
-            <a:r>
-              <a:rPr lang="de-DE" dirty="0" smtClean="0">
-                <a:hlinkClick r:id="rId2"/>
-              </a:rPr>
-              <a:t>2Fwebapps%2Fblackboard%2Fexecute%2Flauncher%3Ftype%3DCourse%26id%3D_261651_1%26url%3D</a:t>
-            </a:r>
-            <a:endParaRPr lang="de-DE" dirty="0" smtClean="0"/>
-          </a:p>
-          <a:p>
-            <a:endParaRPr lang="de-DE" dirty="0"/>
-          </a:p>
-        </p:txBody>
-      </p:sp>
+        </p:nvPicPr>
+        <p:blipFill>
+          <a:blip r:embed="rId2" cstate="print"/>
+          <a:stretch>
+            <a:fillRect/>
+          </a:stretch>
+        </p:blipFill>
+        <p:spPr>
+          <a:xfrm>
+            <a:off x="2150609" y="1600200"/>
+            <a:ext cx="4842781" cy="4525963"/>
+          </a:xfrm>
+        </p:spPr>
+      </p:pic>
     </p:spTree>
-    <p:extLst>
-      <p:ext uri="{BB962C8B-B14F-4D97-AF65-F5344CB8AC3E}">
-        <p14:creationId xmlns:p14="http://schemas.microsoft.com/office/powerpoint/2010/main" val="1560432982"/>
-      </p:ext>
-    </p:extLst>
   </p:cSld>
   <p:clrMapOvr>
     <a:masterClrMapping/>

</xml_diff>

<commit_message>
OnLib.pptx SRS-Tabelle bearbeitet Stichpunkte.docx hinzugefügt mit "Stichpunkten" für die Präsentation
</commit_message>
<xml_diff>
--- a/Semester 1 Ende/OnLib.pptx
+++ b/Semester 1 Ende/OnLib.pptx
@@ -3439,7 +3439,7 @@
     </p:spTree>
     <p:extLst>
       <p:ext uri="{BB962C8B-B14F-4D97-AF65-F5344CB8AC3E}">
-        <p14:creationId xmlns:p14="http://schemas.microsoft.com/office/powerpoint/2010/main" xmlns="" val="3833381630"/>
+        <p14:creationId xmlns="" xmlns:p14="http://schemas.microsoft.com/office/powerpoint/2010/main" val="3833381630"/>
       </p:ext>
     </p:extLst>
   </p:cSld>
@@ -3537,7 +3537,7 @@
     </p:spTree>
     <p:extLst>
       <p:ext uri="{BB962C8B-B14F-4D97-AF65-F5344CB8AC3E}">
-        <p14:creationId xmlns:p14="http://schemas.microsoft.com/office/powerpoint/2010/main" xmlns="" val="1560432982"/>
+        <p14:creationId xmlns="" xmlns:p14="http://schemas.microsoft.com/office/powerpoint/2010/main" val="1560432982"/>
       </p:ext>
     </p:extLst>
   </p:cSld>
@@ -3626,7 +3626,7 @@
     </p:spTree>
     <p:extLst>
       <p:ext uri="{BB962C8B-B14F-4D97-AF65-F5344CB8AC3E}">
-        <p14:creationId xmlns:p14="http://schemas.microsoft.com/office/powerpoint/2010/main" xmlns="" val="2311595745"/>
+        <p14:creationId xmlns="" xmlns:p14="http://schemas.microsoft.com/office/powerpoint/2010/main" val="2311595745"/>
       </p:ext>
     </p:extLst>
   </p:cSld>
@@ -3727,7 +3727,7 @@
     </p:spTree>
     <p:extLst>
       <p:ext uri="{BB962C8B-B14F-4D97-AF65-F5344CB8AC3E}">
-        <p14:creationId xmlns:p14="http://schemas.microsoft.com/office/powerpoint/2010/main" xmlns="" val="3944274436"/>
+        <p14:creationId xmlns="" xmlns:p14="http://schemas.microsoft.com/office/powerpoint/2010/main" val="3944274436"/>
       </p:ext>
     </p:extLst>
   </p:cSld>
@@ -3882,7 +3882,7 @@
     </p:spTree>
     <p:extLst>
       <p:ext uri="{BB962C8B-B14F-4D97-AF65-F5344CB8AC3E}">
-        <p14:creationId xmlns:p14="http://schemas.microsoft.com/office/powerpoint/2010/main" xmlns="" val="3655997885"/>
+        <p14:creationId xmlns="" xmlns:p14="http://schemas.microsoft.com/office/powerpoint/2010/main" val="3655997885"/>
       </p:ext>
     </p:extLst>
   </p:cSld>
@@ -3949,7 +3949,7 @@
             <p:ph idx="1"/>
             <p:extLst>
               <p:ext uri="{D42A27DB-BD31-4B8C-83A1-F6EECF244321}">
-                <p14:modId xmlns:p14="http://schemas.microsoft.com/office/powerpoint/2010/main" xmlns="" val="1021946998"/>
+                <p14:modId xmlns="" xmlns:p14="http://schemas.microsoft.com/office/powerpoint/2010/main" val="1021946998"/>
               </p:ext>
             </p:extLst>
           </p:nvPr>
@@ -4002,7 +4002,15 @@
                     <a:p>
                       <a:r>
                         <a:rPr lang="de-DE" dirty="0" smtClean="0"/>
-                        <a:t>Bestimmt relevant</a:t>
+                        <a:t>Bedingt</a:t>
+                      </a:r>
+                      <a:r>
+                        <a:rPr lang="de-DE" baseline="0" dirty="0" smtClean="0"/>
+                        <a:t> </a:t>
+                      </a:r>
+                      <a:r>
+                        <a:rPr lang="de-DE" dirty="0" smtClean="0"/>
+                        <a:t>relevant</a:t>
                       </a:r>
                       <a:endParaRPr lang="de-DE" dirty="0"/>
                     </a:p>
@@ -4096,6 +4104,17 @@
                     <a:lstStyle/>
                     <a:p>
                       <a:pPr algn="ctr"/>
+                      <a:endParaRPr lang="de-DE" dirty="0"/>
+                    </a:p>
+                  </a:txBody>
+                  <a:tcPr/>
+                </a:tc>
+                <a:tc>
+                  <a:txBody>
+                    <a:bodyPr/>
+                    <a:lstStyle/>
+                    <a:p>
+                      <a:pPr algn="ctr"/>
                       <a:r>
                         <a:rPr lang="de-DE" dirty="0" smtClean="0"/>
                         <a:t>X</a:t>
@@ -4110,17 +4129,7 @@
                     <a:bodyPr/>
                     <a:lstStyle/>
                     <a:p>
-                      <a:endParaRPr lang="de-DE"/>
-                    </a:p>
-                  </a:txBody>
-                  <a:tcPr/>
-                </a:tc>
-                <a:tc>
-                  <a:txBody>
-                    <a:bodyPr/>
-                    <a:lstStyle/>
-                    <a:p>
-                      <a:endParaRPr lang="de-DE"/>
+                      <a:endParaRPr lang="de-DE" dirty="0"/>
                     </a:p>
                   </a:txBody>
                   <a:tcPr/>
@@ -4488,7 +4497,7 @@
     </p:spTree>
     <p:extLst>
       <p:ext uri="{BB962C8B-B14F-4D97-AF65-F5344CB8AC3E}">
-        <p14:creationId xmlns:p14="http://schemas.microsoft.com/office/powerpoint/2010/main" xmlns="" val="1343455114"/>
+        <p14:creationId xmlns="" xmlns:p14="http://schemas.microsoft.com/office/powerpoint/2010/main" val="1343455114"/>
       </p:ext>
     </p:extLst>
   </p:cSld>
@@ -4600,7 +4609,7 @@
     </p:spTree>
     <p:extLst>
       <p:ext uri="{BB962C8B-B14F-4D97-AF65-F5344CB8AC3E}">
-        <p14:creationId xmlns:p14="http://schemas.microsoft.com/office/powerpoint/2010/main" xmlns="" val="3643120636"/>
+        <p14:creationId xmlns="" xmlns:p14="http://schemas.microsoft.com/office/powerpoint/2010/main" val="3643120636"/>
       </p:ext>
     </p:extLst>
   </p:cSld>
@@ -4675,7 +4684,7 @@
           <a:blip r:embed="rId2" cstate="print">
             <a:extLst>
               <a:ext uri="{28A0092B-C50C-407E-A947-70E740481C1C}">
-                <a14:useLocalDpi xmlns:a14="http://schemas.microsoft.com/office/drawing/2010/main" xmlns="" val="0"/>
+                <a14:useLocalDpi xmlns="" xmlns:a14="http://schemas.microsoft.com/office/drawing/2010/main" val="0"/>
               </a:ext>
             </a:extLst>
           </a:blip>
@@ -4693,7 +4702,7 @@
     </p:spTree>
     <p:extLst>
       <p:ext uri="{BB962C8B-B14F-4D97-AF65-F5344CB8AC3E}">
-        <p14:creationId xmlns:p14="http://schemas.microsoft.com/office/powerpoint/2010/main" xmlns="" val="1629079801"/>
+        <p14:creationId xmlns="" xmlns:p14="http://schemas.microsoft.com/office/powerpoint/2010/main" val="1629079801"/>
       </p:ext>
     </p:extLst>
   </p:cSld>
@@ -4764,7 +4773,7 @@
           <a:blip r:embed="rId2" cstate="print">
             <a:extLst>
               <a:ext uri="{28A0092B-C50C-407E-A947-70E740481C1C}">
-                <a14:useLocalDpi xmlns:a14="http://schemas.microsoft.com/office/drawing/2010/main" xmlns="" val="0"/>
+                <a14:useLocalDpi xmlns="" xmlns:a14="http://schemas.microsoft.com/office/drawing/2010/main" val="0"/>
               </a:ext>
             </a:extLst>
           </a:blip>
@@ -4782,7 +4791,7 @@
     </p:spTree>
     <p:extLst>
       <p:ext uri="{BB962C8B-B14F-4D97-AF65-F5344CB8AC3E}">
-        <p14:creationId xmlns:p14="http://schemas.microsoft.com/office/powerpoint/2010/main" xmlns="" val="1131379367"/>
+        <p14:creationId xmlns="" xmlns:p14="http://schemas.microsoft.com/office/powerpoint/2010/main" val="1131379367"/>
       </p:ext>
     </p:extLst>
   </p:cSld>
@@ -4947,7 +4956,7 @@
     </p:spTree>
     <p:extLst>
       <p:ext uri="{BB962C8B-B14F-4D97-AF65-F5344CB8AC3E}">
-        <p14:creationId xmlns:p14="http://schemas.microsoft.com/office/powerpoint/2010/main" xmlns="" val="2911736427"/>
+        <p14:creationId xmlns="" xmlns:p14="http://schemas.microsoft.com/office/powerpoint/2010/main" val="2911736427"/>
       </p:ext>
     </p:extLst>
   </p:cSld>
@@ -5018,7 +5027,7 @@
           <a:blip r:embed="rId2" cstate="print">
             <a:extLst>
               <a:ext uri="{28A0092B-C50C-407E-A947-70E740481C1C}">
-                <a14:useLocalDpi xmlns:a14="http://schemas.microsoft.com/office/drawing/2010/main" xmlns="" val="0"/>
+                <a14:useLocalDpi xmlns="" xmlns:a14="http://schemas.microsoft.com/office/drawing/2010/main" val="0"/>
               </a:ext>
             </a:extLst>
           </a:blip>
@@ -5044,7 +5053,7 @@
     </p:spTree>
     <p:extLst>
       <p:ext uri="{BB962C8B-B14F-4D97-AF65-F5344CB8AC3E}">
-        <p14:creationId xmlns:p14="http://schemas.microsoft.com/office/powerpoint/2010/main" xmlns="" val="813013107"/>
+        <p14:creationId xmlns="" xmlns:p14="http://schemas.microsoft.com/office/powerpoint/2010/main" val="813013107"/>
       </p:ext>
     </p:extLst>
   </p:cSld>

</xml_diff>

<commit_message>
[OnLib.pptx] "Fehlt noch"-Folie gelöscht
</commit_message>
<xml_diff>
--- a/Semester 1 Ende/OnLib.pptx
+++ b/Semester 1 Ende/OnLib.pptx
@@ -16,12 +16,11 @@
     <p:sldId id="268" r:id="rId10"/>
     <p:sldId id="266" r:id="rId11"/>
     <p:sldId id="261" r:id="rId12"/>
-    <p:sldId id="265" r:id="rId13"/>
   </p:sldIdLst>
   <p:sldSz cx="9144000" cy="6858000" type="screen4x3"/>
   <p:notesSz cx="6858000" cy="9144000"/>
   <p:custDataLst>
-    <p:tags r:id="rId14"/>
+    <p:tags r:id="rId13"/>
   </p:custDataLst>
   <p:defaultTextStyle>
     <a:defPPr>
@@ -3627,107 +3626,6 @@
     <p:extLst>
       <p:ext uri="{BB962C8B-B14F-4D97-AF65-F5344CB8AC3E}">
         <p14:creationId xmlns="" xmlns:p14="http://schemas.microsoft.com/office/powerpoint/2010/main" val="2311595745"/>
-      </p:ext>
-    </p:extLst>
-  </p:cSld>
-  <p:clrMapOvr>
-    <a:masterClrMapping/>
-  </p:clrMapOvr>
-  <p:timing>
-    <p:tnLst>
-      <p:par>
-        <p:cTn id="1" dur="indefinite" restart="never" nodeType="tmRoot"/>
-      </p:par>
-    </p:tnLst>
-  </p:timing>
-</p:sld>
-</file>
-
-<file path=ppt/slides/slide12.xml><?xml version="1.0" encoding="utf-8"?>
-<p:sld xmlns:a="http://schemas.openxmlformats.org/drawingml/2006/main" xmlns:r="http://schemas.openxmlformats.org/officeDocument/2006/relationships" xmlns:p="http://schemas.openxmlformats.org/presentationml/2006/main">
-  <p:cSld>
-    <p:spTree>
-      <p:nvGrpSpPr>
-        <p:cNvPr id="1" name=""/>
-        <p:cNvGrpSpPr/>
-        <p:nvPr/>
-      </p:nvGrpSpPr>
-      <p:grpSpPr>
-        <a:xfrm>
-          <a:off x="0" y="0"/>
-          <a:ext cx="0" cy="0"/>
-          <a:chOff x="0" y="0"/>
-          <a:chExt cx="0" cy="0"/>
-        </a:xfrm>
-      </p:grpSpPr>
-      <p:sp>
-        <p:nvSpPr>
-          <p:cNvPr id="2" name="Titel 1"/>
-          <p:cNvSpPr>
-            <a:spLocks noGrp="1"/>
-          </p:cNvSpPr>
-          <p:nvPr>
-            <p:ph type="title"/>
-          </p:nvPr>
-        </p:nvSpPr>
-        <p:spPr/>
-        <p:txBody>
-          <a:bodyPr/>
-          <a:lstStyle/>
-          <a:p>
-            <a:r>
-              <a:rPr lang="de-DE" dirty="0" smtClean="0"/>
-              <a:t>Fehlt noch</a:t>
-            </a:r>
-            <a:endParaRPr lang="de-DE" dirty="0"/>
-          </a:p>
-        </p:txBody>
-      </p:sp>
-      <p:sp>
-        <p:nvSpPr>
-          <p:cNvPr id="3" name="Inhaltsplatzhalter 2"/>
-          <p:cNvSpPr>
-            <a:spLocks noGrp="1"/>
-          </p:cNvSpPr>
-          <p:nvPr>
-            <p:ph idx="1"/>
-          </p:nvPr>
-        </p:nvSpPr>
-        <p:spPr/>
-        <p:txBody>
-          <a:bodyPr/>
-          <a:lstStyle/>
-          <a:p>
-            <a:r>
-              <a:rPr lang="de-DE" dirty="0" err="1" smtClean="0"/>
-              <a:t>Deployment</a:t>
-            </a:r>
-            <a:r>
-              <a:rPr lang="de-DE" dirty="0" smtClean="0"/>
-              <a:t> </a:t>
-            </a:r>
-            <a:r>
-              <a:rPr lang="de-DE" dirty="0" err="1" smtClean="0"/>
-              <a:t>Diagram</a:t>
-            </a:r>
-            <a:r>
-              <a:rPr lang="de-DE" dirty="0" smtClean="0"/>
-              <a:t> </a:t>
-            </a:r>
-          </a:p>
-          <a:p>
-            <a:r>
-              <a:rPr lang="de-DE" smtClean="0"/>
-              <a:t>Aufbau Framework</a:t>
-            </a:r>
-            <a:endParaRPr lang="de-DE" dirty="0" smtClean="0"/>
-          </a:p>
-        </p:txBody>
-      </p:sp>
-    </p:spTree>
-    <p:extLst>
-      <p:ext uri="{BB962C8B-B14F-4D97-AF65-F5344CB8AC3E}">
-        <p14:creationId xmlns="" xmlns:p14="http://schemas.microsoft.com/office/powerpoint/2010/main" val="3944274436"/>
       </p:ext>
     </p:extLst>
   </p:cSld>

</xml_diff>